<commit_message>
Updates algorithms presentation with information about mazes and cups
</commit_message>
<xml_diff>
--- a/algorithms/algorithms_presentation.pptx
+++ b/algorithms/algorithms_presentation.pptx
@@ -112,6 +112,11 @@
       </a:defRPr>
     </a:lvl9pPr>
   </p:defaultTextStyle>
+  <p:extLst>
+    <p:ext uri="{EFAFB233-063F-42B5-8137-9DF3F51BA10A}">
+      <p15:sldGuideLst xmlns:p15="http://schemas.microsoft.com/office/powerpoint/2012/main"/>
+    </p:ext>
+  </p:extLst>
 </p:presentation>
 </file>
 
@@ -246,7 +251,7 @@
           <a:p>
             <a:fld id="{FDBE5A2E-033C-4A62-9508-9B1C2CDFD2AF}" type="datetimeFigureOut">
               <a:rPr lang="en-AU" smtClean="0"/>
-              <a:t>27/05/2016</a:t>
+              <a:t>16/06/2016</a:t>
             </a:fld>
             <a:endParaRPr lang="en-AU"/>
           </a:p>
@@ -416,7 +421,7 @@
           <a:p>
             <a:fld id="{FDBE5A2E-033C-4A62-9508-9B1C2CDFD2AF}" type="datetimeFigureOut">
               <a:rPr lang="en-AU" smtClean="0"/>
-              <a:t>27/05/2016</a:t>
+              <a:t>16/06/2016</a:t>
             </a:fld>
             <a:endParaRPr lang="en-AU"/>
           </a:p>
@@ -596,7 +601,7 @@
           <a:p>
             <a:fld id="{FDBE5A2E-033C-4A62-9508-9B1C2CDFD2AF}" type="datetimeFigureOut">
               <a:rPr lang="en-AU" smtClean="0"/>
-              <a:t>27/05/2016</a:t>
+              <a:t>16/06/2016</a:t>
             </a:fld>
             <a:endParaRPr lang="en-AU"/>
           </a:p>
@@ -766,7 +771,7 @@
           <a:p>
             <a:fld id="{FDBE5A2E-033C-4A62-9508-9B1C2CDFD2AF}" type="datetimeFigureOut">
               <a:rPr lang="en-AU" smtClean="0"/>
-              <a:t>27/05/2016</a:t>
+              <a:t>16/06/2016</a:t>
             </a:fld>
             <a:endParaRPr lang="en-AU"/>
           </a:p>
@@ -1012,7 +1017,7 @@
           <a:p>
             <a:fld id="{FDBE5A2E-033C-4A62-9508-9B1C2CDFD2AF}" type="datetimeFigureOut">
               <a:rPr lang="en-AU" smtClean="0"/>
-              <a:t>27/05/2016</a:t>
+              <a:t>16/06/2016</a:t>
             </a:fld>
             <a:endParaRPr lang="en-AU"/>
           </a:p>
@@ -1244,7 +1249,7 @@
           <a:p>
             <a:fld id="{FDBE5A2E-033C-4A62-9508-9B1C2CDFD2AF}" type="datetimeFigureOut">
               <a:rPr lang="en-AU" smtClean="0"/>
-              <a:t>27/05/2016</a:t>
+              <a:t>16/06/2016</a:t>
             </a:fld>
             <a:endParaRPr lang="en-AU"/>
           </a:p>
@@ -1611,7 +1616,7 @@
           <a:p>
             <a:fld id="{FDBE5A2E-033C-4A62-9508-9B1C2CDFD2AF}" type="datetimeFigureOut">
               <a:rPr lang="en-AU" smtClean="0"/>
-              <a:t>27/05/2016</a:t>
+              <a:t>16/06/2016</a:t>
             </a:fld>
             <a:endParaRPr lang="en-AU"/>
           </a:p>
@@ -1729,7 +1734,7 @@
           <a:p>
             <a:fld id="{FDBE5A2E-033C-4A62-9508-9B1C2CDFD2AF}" type="datetimeFigureOut">
               <a:rPr lang="en-AU" smtClean="0"/>
-              <a:t>27/05/2016</a:t>
+              <a:t>16/06/2016</a:t>
             </a:fld>
             <a:endParaRPr lang="en-AU"/>
           </a:p>
@@ -1824,7 +1829,7 @@
           <a:p>
             <a:fld id="{FDBE5A2E-033C-4A62-9508-9B1C2CDFD2AF}" type="datetimeFigureOut">
               <a:rPr lang="en-AU" smtClean="0"/>
-              <a:t>27/05/2016</a:t>
+              <a:t>16/06/2016</a:t>
             </a:fld>
             <a:endParaRPr lang="en-AU"/>
           </a:p>
@@ -2101,7 +2106,7 @@
           <a:p>
             <a:fld id="{FDBE5A2E-033C-4A62-9508-9B1C2CDFD2AF}" type="datetimeFigureOut">
               <a:rPr lang="en-AU" smtClean="0"/>
-              <a:t>27/05/2016</a:t>
+              <a:t>16/06/2016</a:t>
             </a:fld>
             <a:endParaRPr lang="en-AU"/>
           </a:p>
@@ -2354,7 +2359,7 @@
           <a:p>
             <a:fld id="{FDBE5A2E-033C-4A62-9508-9B1C2CDFD2AF}" type="datetimeFigureOut">
               <a:rPr lang="en-AU" smtClean="0"/>
-              <a:t>27/05/2016</a:t>
+              <a:t>16/06/2016</a:t>
             </a:fld>
             <a:endParaRPr lang="en-AU"/>
           </a:p>
@@ -2567,7 +2572,7 @@
           <a:p>
             <a:fld id="{FDBE5A2E-033C-4A62-9508-9B1C2CDFD2AF}" type="datetimeFigureOut">
               <a:rPr lang="en-AU" smtClean="0"/>
-              <a:t>27/05/2016</a:t>
+              <a:t>16/06/2016</a:t>
             </a:fld>
             <a:endParaRPr lang="en-AU"/>
           </a:p>
@@ -4330,7 +4335,31 @@
                   <a:srgbClr val="000000"/>
                 </a:solidFill>
               </a:rPr>
-              <a:t>I’ll hand out some worksheets with some tracks that you will have to make using cups and masking tape. </a:t>
+              <a:t>I’ll hand out some worksheets with some </a:t>
+            </a:r>
+            <a:r>
+              <a:rPr lang="en-AU" dirty="0" smtClean="0">
+                <a:solidFill>
+                  <a:srgbClr val="000000"/>
+                </a:solidFill>
+              </a:rPr>
+              <a:t>mazes </a:t>
+            </a:r>
+            <a:r>
+              <a:rPr lang="en-AU" dirty="0">
+                <a:solidFill>
+                  <a:srgbClr val="000000"/>
+                </a:solidFill>
+              </a:rPr>
+              <a:t>that you will have to make using </a:t>
+            </a:r>
+            <a:r>
+              <a:rPr lang="en-AU" dirty="0" smtClean="0">
+                <a:solidFill>
+                  <a:srgbClr val="000000"/>
+                </a:solidFill>
+              </a:rPr>
+              <a:t>cups.</a:t>
             </a:r>
           </a:p>
           <a:p>
@@ -4349,7 +4378,39 @@
                   <a:srgbClr val="000000"/>
                 </a:solidFill>
               </a:rPr>
-              <a:t>Your goal is to get the robot to reach the goal (the masking tape) without hitting any cups</a:t>
+              <a:t>Your goal is to </a:t>
+            </a:r>
+            <a:r>
+              <a:rPr lang="en-AU" dirty="0" smtClean="0">
+                <a:solidFill>
+                  <a:srgbClr val="000000"/>
+                </a:solidFill>
+              </a:rPr>
+              <a:t>help the robot escape </a:t>
+            </a:r>
+            <a:r>
+              <a:rPr lang="en-AU" smtClean="0">
+                <a:solidFill>
+                  <a:srgbClr val="000000"/>
+                </a:solidFill>
+              </a:rPr>
+              <a:t>the maze </a:t>
+            </a:r>
+            <a:r>
+              <a:rPr lang="en-AU" smtClean="0">
+                <a:solidFill>
+                  <a:srgbClr val="000000"/>
+                </a:solidFill>
+              </a:rPr>
+              <a:t>without </a:t>
+            </a:r>
+            <a:r>
+              <a:rPr lang="en-AU" dirty="0">
+                <a:solidFill>
+                  <a:srgbClr val="000000"/>
+                </a:solidFill>
+              </a:rPr>
+              <a:t>hitting any cups</a:t>
             </a:r>
           </a:p>
           <a:p>
@@ -4478,11 +4539,7 @@
             </a:pPr>
             <a:r>
               <a:rPr lang="en-AU" b="1" dirty="0" smtClean="0"/>
-              <a:t>2: “What is an Algorithm?” - </a:t>
-            </a:r>
-            <a:r>
-              <a:rPr lang="en-AU" b="1" dirty="0" smtClean="0"/>
-              <a:t>BBC </a:t>
+              <a:t>2: “What is an Algorithm?” - BBC </a:t>
             </a:r>
             <a:r>
               <a:rPr lang="en-AU" b="1" dirty="0" err="1" smtClean="0"/>
@@ -4587,15 +4644,7 @@
             </a:pPr>
             <a:r>
               <a:rPr lang="en-AU" b="1" dirty="0" smtClean="0"/>
-              <a:t>6: </a:t>
-            </a:r>
-            <a:r>
-              <a:rPr lang="en-AU" b="1" dirty="0" smtClean="0"/>
-              <a:t>Writing Algorithms - </a:t>
-            </a:r>
-            <a:r>
-              <a:rPr lang="en-AU" b="1" dirty="0" smtClean="0"/>
-              <a:t>Krishna </a:t>
+              <a:t>6: Writing Algorithms - Krishna </a:t>
             </a:r>
             <a:r>
               <a:rPr lang="en-AU" b="1" dirty="0" err="1" smtClean="0"/>

</xml_diff>